<commit_message>
minor edit to powerpoint presentation
</commit_message>
<xml_diff>
--- a/Git_CTRL.pptx
+++ b/Git_CTRL.pptx
@@ -564,11 +564,7 @@
             </a:r>
             <a:r>
               <a:rPr lang="en-US" baseline="0" dirty="0" smtClean="0"/>
-              <a:t>, </a:t>
-            </a:r>
-            <a:r>
-              <a:rPr lang="en-US" baseline="0" dirty="0" smtClean="0"/>
-              <a:t>titled </a:t>
+              <a:t>, titled </a:t>
             </a:r>
             <a:r>
               <a:rPr lang="en-US" sz="1200" b="1" kern="1200" dirty="0" smtClean="0">
@@ -580,19 +576,7 @@
                 <a:ea typeface="+mn-ea"/>
                 <a:cs typeface="+mn-cs"/>
               </a:rPr>
-              <a:t>A GitHub ‘Garage’ for a Digital Humanities </a:t>
-            </a:r>
-            <a:r>
-              <a:rPr lang="en-US" sz="1200" b="1" kern="1200" dirty="0" smtClean="0">
-                <a:solidFill>
-                  <a:schemeClr val="tx1"/>
-                </a:solidFill>
-                <a:effectLst/>
-                <a:latin typeface="+mn-lt"/>
-                <a:ea typeface="+mn-ea"/>
-                <a:cs typeface="+mn-cs"/>
-              </a:rPr>
-              <a:t>Course</a:t>
+              <a:t>A GitHub ‘Garage’ for a Digital Humanities Course</a:t>
             </a:r>
             <a:r>
               <a:rPr lang="en-US" sz="1200" b="1" kern="1200" baseline="0" dirty="0" smtClean="0">
@@ -813,53 +797,8 @@
                 <a:ea typeface="+mn-ea"/>
                 <a:cs typeface="+mn-cs"/>
               </a:rPr>
-              <a:t>This means that even if you're using a centralized workflow, every user essentially has a full backup of the main server. Each of these copies could be pushed up to replace the main server in the event of a crash or corruption. In effect, there is no single point of failure with </a:t>
-            </a:r>
-            <a:r>
-              <a:rPr lang="en-US" sz="1200" b="0" i="0" kern="1200" dirty="0" smtClean="0">
-                <a:solidFill>
-                  <a:schemeClr val="tx1"/>
-                </a:solidFill>
-                <a:effectLst/>
-                <a:latin typeface="+mn-lt"/>
-                <a:ea typeface="+mn-ea"/>
-                <a:cs typeface="+mn-cs"/>
-              </a:rPr>
-              <a:t>Git (less </a:t>
-            </a:r>
-            <a:r>
-              <a:rPr lang="en-US" sz="1200" b="0" i="0" kern="1200" dirty="0" smtClean="0">
-                <a:solidFill>
-                  <a:schemeClr val="tx1"/>
-                </a:solidFill>
-                <a:effectLst/>
-                <a:latin typeface="+mn-lt"/>
-                <a:ea typeface="+mn-ea"/>
-                <a:cs typeface="+mn-cs"/>
-              </a:rPr>
-              <a:t>there is only a single copy of the </a:t>
-            </a:r>
-            <a:r>
-              <a:rPr lang="en-US" sz="1200" b="0" i="0" kern="1200" dirty="0" smtClean="0">
-                <a:solidFill>
-                  <a:schemeClr val="tx1"/>
-                </a:solidFill>
-                <a:effectLst/>
-                <a:latin typeface="+mn-lt"/>
-                <a:ea typeface="+mn-ea"/>
-                <a:cs typeface="+mn-cs"/>
-              </a:rPr>
-              <a:t>repository).</a:t>
-            </a:r>
-            <a:endParaRPr lang="en-US" sz="1200" b="0" i="0" kern="1200" dirty="0" smtClean="0">
-              <a:solidFill>
-                <a:schemeClr val="tx1"/>
-              </a:solidFill>
-              <a:effectLst/>
-              <a:latin typeface="+mn-lt"/>
-              <a:ea typeface="+mn-ea"/>
-              <a:cs typeface="+mn-cs"/>
-            </a:endParaRPr>
+              <a:t>This means that even if you're using a centralized workflow, every user essentially has a full backup of the main server. Each of these copies could be pushed up to replace the main server in the event of a crash or corruption. In effect, there is no single point of failure with Git (less there is only a single copy of the repository).</a:t>
+            </a:r>
           </a:p>
           <a:p>
             <a:r>
@@ -972,41 +911,8 @@
           <a:p>
             <a:r>
               <a:rPr lang="en-US" baseline="0" dirty="0" smtClean="0"/>
-              <a:t>I think the best source for documentation is the source itself so here is the </a:t>
-            </a:r>
-            <a:r>
-              <a:rPr lang="en-US" baseline="0" dirty="0" smtClean="0"/>
-              <a:t>link </a:t>
-            </a:r>
-            <a:r>
-              <a:rPr lang="en-US" baseline="0" dirty="0" smtClean="0"/>
-              <a:t>for all of the </a:t>
-            </a:r>
-            <a:r>
-              <a:rPr lang="en-US" baseline="0" dirty="0" smtClean="0"/>
-              <a:t>documentation you </a:t>
-            </a:r>
-            <a:r>
-              <a:rPr lang="en-US" baseline="0" dirty="0" smtClean="0"/>
-              <a:t>will need to get Git installed and begin working with Git and GitHub. </a:t>
-            </a:r>
-            <a:r>
-              <a:rPr lang="en-US" baseline="0" dirty="0" smtClean="0"/>
-              <a:t>Note: There is </a:t>
-            </a:r>
-            <a:r>
-              <a:rPr lang="en-US" baseline="0" dirty="0" smtClean="0"/>
-              <a:t>a plethora of resources about Git and GitHub available via </a:t>
-            </a:r>
-            <a:r>
-              <a:rPr lang="en-US" baseline="0" dirty="0" smtClean="0"/>
-              <a:t>YouTube, </a:t>
-            </a:r>
-            <a:r>
-              <a:rPr lang="en-US" baseline="0" dirty="0" smtClean="0"/>
-              <a:t>stack exchange, etc. since it is so well known among developers worldwide. </a:t>
-            </a:r>
-            <a:endParaRPr lang="en-US" baseline="0" dirty="0" smtClean="0"/>
+              <a:t>I think the best source for documentation is the source itself so here is the link for all of the documentation you will need to get Git installed and begin working with Git and GitHub. Note: There is a plethora of resources about Git and GitHub available via YouTube, stack exchange, etc. since it is so well known among developers worldwide. </a:t>
+            </a:r>
           </a:p>
           <a:p>
             <a:endParaRPr lang="en-US" baseline="0" dirty="0" smtClean="0"/>
@@ -1095,84 +1001,19 @@
           <a:p>
             <a:r>
               <a:rPr lang="en-US" baseline="0" dirty="0" smtClean="0"/>
-              <a:t>I </a:t>
-            </a:r>
+              <a:t>I set these two in contrast with one another because of my personal experience and the experience of our Pitt Greensburg course with Git and GitHub.  Let me explain… the GUI client is a tool that incorporates a “user-friendly” interface outside of shell or command line accessibility. My initial personal experience with Git was using one of the many GUIs available, in particular GitHub Desktop.  What I found was even though the GUI allowed for an easy step-by-step, plug and play understanding of Git, the  GUI failed to offer a way of conceptually understanding the user’s interaction with Git not just of adding and modifying files, committing repository changes, and syncing remote changes but especially when incorporating other Git Workflows that include branching and forking . The kinds of workflows that help to ensure the quality and security of any single repository. What the GUI lacks the command line or shell interface more than compensates. And what we found out in implementing an increased use of Git and GitHub in our DH course was that the command line allows users to come to an equal understanding of the basic and complex concepts that are a critical to the use of Git. </a:t>
+            </a:r>
+          </a:p>
+          <a:p>
+            <a:endParaRPr lang="en-US" baseline="0" dirty="0" smtClean="0"/>
+          </a:p>
+          <a:p>
+            <a:endParaRPr lang="en-US" baseline="0" dirty="0" smtClean="0"/>
+          </a:p>
+          <a:p>
             <a:r>
               <a:rPr lang="en-US" baseline="0" dirty="0" smtClean="0"/>
-              <a:t>set these two in contrast with one another because of my personal experience and the experience of our Pitt Greensburg course with Git and GitHub.  Let me explain… the GUI client is a tool that incorporates a “user-friendly” interface outside of shell or command line accessibility. My initial personal experience with Git was using one of the many GUIs </a:t>
-            </a:r>
-            <a:r>
-              <a:rPr lang="en-US" baseline="0" dirty="0" smtClean="0"/>
-              <a:t>available, in particular GitHub </a:t>
-            </a:r>
-            <a:r>
-              <a:rPr lang="en-US" baseline="0" dirty="0" smtClean="0"/>
-              <a:t>Desktop.  What I found was even though the GUI allowed for an </a:t>
-            </a:r>
-            <a:r>
-              <a:rPr lang="en-US" baseline="0" dirty="0" smtClean="0"/>
-              <a:t>easy step-by-step, plug and play </a:t>
-            </a:r>
-            <a:r>
-              <a:rPr lang="en-US" baseline="0" dirty="0" smtClean="0"/>
-              <a:t>understanding of </a:t>
-            </a:r>
-            <a:r>
-              <a:rPr lang="en-US" baseline="0" dirty="0" smtClean="0"/>
-              <a:t>Git, the  GUI failed to offer a way of conceptually understanding the user’s interaction with </a:t>
-            </a:r>
-            <a:r>
-              <a:rPr lang="en-US" baseline="0" dirty="0" smtClean="0"/>
-              <a:t>Git </a:t>
-            </a:r>
-            <a:r>
-              <a:rPr lang="en-US" baseline="0" dirty="0" smtClean="0"/>
-              <a:t>not just of </a:t>
-            </a:r>
-            <a:r>
-              <a:rPr lang="en-US" baseline="0" dirty="0" smtClean="0"/>
-              <a:t>adding and modifying files, committing repository changes, and syncing remote changes </a:t>
-            </a:r>
-            <a:r>
-              <a:rPr lang="en-US" baseline="0" dirty="0" smtClean="0"/>
-              <a:t>but especially when incorporating other Git </a:t>
-            </a:r>
-            <a:r>
-              <a:rPr lang="en-US" baseline="0" dirty="0" smtClean="0"/>
-              <a:t>Workflows that include branching and </a:t>
-            </a:r>
-            <a:r>
-              <a:rPr lang="en-US" baseline="0" dirty="0" smtClean="0"/>
-              <a:t>forking . The kinds of workflows </a:t>
-            </a:r>
-            <a:r>
-              <a:rPr lang="en-US" baseline="0" dirty="0" smtClean="0"/>
-              <a:t>that help to ensure the quality and security of any single repository. What the GUI lacks the command line or shell interface more than compensates. And what we found out in implementing an increased use of Git and GitHub in our DH </a:t>
-            </a:r>
-            <a:r>
-              <a:rPr lang="en-US" baseline="0" dirty="0" smtClean="0"/>
-              <a:t>course was that </a:t>
-            </a:r>
-            <a:r>
-              <a:rPr lang="en-US" baseline="0" dirty="0" smtClean="0"/>
-              <a:t>the command line allows users to come to an equal understanding of the basic and complex concepts that are a critical to the use of Git. </a:t>
-            </a:r>
-            <a:endParaRPr lang="en-US" baseline="0" dirty="0" smtClean="0"/>
-          </a:p>
-          <a:p>
-            <a:endParaRPr lang="en-US" baseline="0" dirty="0" smtClean="0"/>
-          </a:p>
-          <a:p>
-            <a:endParaRPr lang="en-US" baseline="0" dirty="0" smtClean="0"/>
-          </a:p>
-          <a:p>
-            <a:r>
-              <a:rPr lang="en-US" baseline="0" dirty="0" smtClean="0"/>
-              <a:t>Some people might prefer to still download </a:t>
-            </a:r>
-            <a:r>
-              <a:rPr lang="en-US" baseline="0" dirty="0" smtClean="0"/>
-              <a:t>the GUI use it for configuration and setup and access points, but then perform the daily tasks of Git use through command line. </a:t>
+              <a:t>Some people might prefer to still download the GUI use it for configuration and setup and access points, but then perform the daily tasks of Git use through command line. </a:t>
             </a:r>
             <a:endParaRPr lang="en-US" dirty="0"/>
           </a:p>
@@ -7678,40 +7519,19 @@
                   <a:schemeClr val="tx1"/>
                 </a:solidFill>
               </a:rPr>
-              <a:t>luc</a:t>
-            </a:r>
+              <a:t>luc.edu</a:t>
+            </a:r>
+          </a:p>
+          <a:p>
+            <a:pPr algn="l"/>
             <a:r>
               <a:rPr lang="en-US" sz="3200" b="1" dirty="0" smtClean="0">
                 <a:solidFill>
-                  <a:schemeClr val="tx1"/>
-                </a:solidFill>
-              </a:rPr>
-              <a:t>.edu</a:t>
-            </a:r>
-          </a:p>
-          <a:p>
-            <a:pPr algn="l"/>
-            <a:r>
-              <a:rPr lang="en-US" sz="3200" b="1" dirty="0" smtClean="0">
-                <a:solidFill>
                   <a:schemeClr val="accent4"/>
                 </a:solidFill>
               </a:rPr>
-              <a:t>https://github.com/RJP4</a:t>
-            </a:r>
-            <a:r>
-              <a:rPr lang="en-US" sz="3200" b="1" dirty="0" smtClean="0">
-                <a:solidFill>
-                  <a:schemeClr val="accent4"/>
-                </a:solidFill>
-              </a:rPr>
-              <a:t>3</a:t>
-            </a:r>
-            <a:endParaRPr lang="en-US" sz="3200" b="1" dirty="0" smtClean="0">
-              <a:solidFill>
-                <a:schemeClr val="accent4"/>
-              </a:solidFill>
-            </a:endParaRPr>
+              <a:t>https://github.com/RJP43</a:t>
+            </a:r>
           </a:p>
           <a:p>
             <a:pPr algn="l"/>
@@ -7743,7 +7563,7 @@
         </p:blipFill>
         <p:spPr>
           <a:xfrm rot="1512043">
-            <a:off x="5446341" y="3279275"/>
+            <a:off x="6507301" y="3376621"/>
             <a:ext cx="3250494" cy="2658534"/>
           </a:xfrm>
           <a:prstGeom prst="rect">
@@ -7979,7 +7799,7 @@
         <p:spPr>
           <a:xfrm>
             <a:off x="502920" y="991143"/>
-            <a:ext cx="9486900" cy="5509200"/>
+            <a:ext cx="9486900" cy="6247864"/>
           </a:xfrm>
           <a:prstGeom prst="rect">
             <a:avLst/>
@@ -7994,7 +7814,7 @@
           <a:p>
             <a:pPr lvl="0"/>
             <a:r>
-              <a:rPr kumimoji="0" lang="en-US" sz="3200" b="0" i="0" u="none" strike="noStrike" kern="1200" cap="none" spc="0" normalizeH="0" baseline="0" noProof="0" dirty="0" smtClean="0">
+              <a:rPr kumimoji="0" lang="en-US" sz="2800" b="0" i="0" u="none" strike="noStrike" kern="1200" cap="none" spc="0" normalizeH="0" baseline="0" noProof="0" dirty="0" smtClean="0">
                 <a:ln>
                   <a:noFill/>
                 </a:ln>
@@ -8008,7 +7828,7 @@
               <a:t>GitHub’s Markdown</a:t>
             </a:r>
             <a:r>
-              <a:rPr kumimoji="0" lang="en-US" sz="3200" b="0" i="0" u="none" strike="noStrike" kern="1200" cap="none" spc="0" normalizeH="0" noProof="0" dirty="0" smtClean="0">
+              <a:rPr kumimoji="0" lang="en-US" sz="2800" b="0" i="0" u="none" strike="noStrike" kern="1200" cap="none" spc="0" normalizeH="0" noProof="0" dirty="0" smtClean="0">
                 <a:ln>
                   <a:noFill/>
                 </a:ln>
@@ -8021,7 +7841,7 @@
               </a:rPr>
               <a:t> Tutorial:</a:t>
             </a:r>
-            <a:endParaRPr lang="en-US" sz="3200" noProof="0" dirty="0" smtClean="0">
+            <a:endParaRPr lang="en-US" sz="2800" noProof="0" dirty="0" smtClean="0">
               <a:solidFill>
                 <a:schemeClr val="accent4"/>
               </a:solidFill>
@@ -8030,7 +7850,7 @@
           <a:p>
             <a:pPr lvl="0"/>
             <a:r>
-              <a:rPr lang="en-US" sz="3200" dirty="0" smtClean="0">
+              <a:rPr lang="en-US" sz="2800" dirty="0" smtClean="0">
                 <a:solidFill>
                   <a:schemeClr val="accent4"/>
                 </a:solidFill>
@@ -8038,7 +7858,7 @@
               <a:t>(</a:t>
             </a:r>
             <a:r>
-              <a:rPr lang="en-US" sz="3200" dirty="0">
+              <a:rPr lang="en-US" sz="2800" dirty="0">
                 <a:solidFill>
                   <a:schemeClr val="accent4"/>
                 </a:solidFill>
@@ -8047,7 +7867,7 @@
               <a:t>https://</a:t>
             </a:r>
             <a:r>
-              <a:rPr lang="en-US" sz="3200" u="sng" dirty="0" smtClean="0">
+              <a:rPr lang="en-US" sz="2800" u="sng" dirty="0" smtClean="0">
                 <a:solidFill>
                   <a:schemeClr val="accent4"/>
                 </a:solidFill>
@@ -8056,7 +7876,7 @@
               <a:t>guides.github.com/features/mastering-markdown</a:t>
             </a:r>
             <a:r>
-              <a:rPr lang="en-US" sz="3200" dirty="0" smtClean="0">
+              <a:rPr lang="en-US" sz="2800" dirty="0" smtClean="0">
                 <a:solidFill>
                   <a:schemeClr val="accent4"/>
                 </a:solidFill>
@@ -8065,7 +7885,7 @@
               <a:t>/</a:t>
             </a:r>
             <a:r>
-              <a:rPr lang="en-US" sz="3200" dirty="0" smtClean="0">
+              <a:rPr lang="en-US" sz="2800" dirty="0" smtClean="0">
                 <a:solidFill>
                   <a:schemeClr val="accent4"/>
                 </a:solidFill>
@@ -8074,7 +7894,7 @@
             </a:r>
           </a:p>
           <a:p>
-            <a:endParaRPr lang="en-US" sz="3200" dirty="0">
+            <a:endParaRPr lang="en-US" sz="2800" dirty="0">
               <a:solidFill>
                 <a:schemeClr val="accent4"/>
               </a:solidFill>
@@ -8082,7 +7902,7 @@
           </a:p>
           <a:p>
             <a:r>
-              <a:rPr lang="en-US" sz="3200" dirty="0" smtClean="0">
+              <a:rPr lang="en-US" sz="2800" dirty="0" smtClean="0">
                 <a:solidFill>
                   <a:schemeClr val="accent4"/>
                 </a:solidFill>
@@ -8092,7 +7912,7 @@
           </a:p>
           <a:p>
             <a:r>
-              <a:rPr lang="en-US" sz="3200" dirty="0">
+              <a:rPr lang="en-US" sz="2800" dirty="0">
                 <a:solidFill>
                   <a:schemeClr val="accent4"/>
                 </a:solidFill>
@@ -8100,7 +7920,7 @@
               <a:t>(</a:t>
             </a:r>
             <a:r>
-              <a:rPr lang="en-US" sz="3200" dirty="0">
+              <a:rPr lang="en-US" sz="2800" dirty="0">
                 <a:solidFill>
                   <a:schemeClr val="accent4"/>
                 </a:solidFill>
@@ -8109,7 +7929,7 @@
               <a:t>https://</a:t>
             </a:r>
             <a:r>
-              <a:rPr lang="en-US" sz="3200" dirty="0" smtClean="0">
+              <a:rPr lang="en-US" sz="2800" dirty="0" smtClean="0">
                 <a:solidFill>
                   <a:schemeClr val="accent4"/>
                 </a:solidFill>
@@ -8118,7 +7938,7 @@
               <a:t>github.com/features</a:t>
             </a:r>
             <a:r>
-              <a:rPr lang="en-US" sz="3200" dirty="0" smtClean="0">
+              <a:rPr lang="en-US" sz="2800" dirty="0" smtClean="0">
                 <a:solidFill>
                   <a:schemeClr val="accent4"/>
                 </a:solidFill>
@@ -8127,7 +7947,7 @@
             </a:r>
           </a:p>
           <a:p>
-            <a:endParaRPr lang="en-US" sz="3200" dirty="0">
+            <a:endParaRPr lang="en-US" sz="2800" dirty="0">
               <a:solidFill>
                 <a:schemeClr val="accent4"/>
               </a:solidFill>
@@ -8135,30 +7955,109 @@
           </a:p>
           <a:p>
             <a:r>
-              <a:rPr lang="en-US" sz="3200" dirty="0">
+              <a:rPr lang="en-US" sz="2800" dirty="0" smtClean="0">
                 <a:solidFill>
                   <a:schemeClr val="accent4"/>
                 </a:solidFill>
               </a:rPr>
-              <a:t>Univ. of Pittsburgh Git Command Line Tutorial : (</a:t>
-            </a:r>
-            <a:r>
-              <a:rPr lang="en-US" sz="3200" dirty="0">
+              <a:t>Becca’s Git </a:t>
+            </a:r>
+            <a:r>
+              <a:rPr lang="en-US" sz="2800" dirty="0">
                 <a:solidFill>
                   <a:schemeClr val="accent4"/>
                 </a:solidFill>
+              </a:rPr>
+              <a:t>Command Line Tutorial : (</a:t>
+            </a:r>
+            <a:r>
+              <a:rPr lang="en-US" sz="2800" dirty="0">
+                <a:solidFill>
+                  <a:schemeClr val="accent4"/>
+                </a:solidFill>
                 <a:hlinkClick r:id="rId5"/>
               </a:rPr>
               <a:t>http://dh.newtfire.org/explainGitShell.html</a:t>
             </a:r>
             <a:r>
-              <a:rPr lang="en-US" sz="3200" dirty="0">
+              <a:rPr lang="en-US" sz="2800" dirty="0">
                 <a:solidFill>
                   <a:schemeClr val="accent4"/>
                 </a:solidFill>
               </a:rPr>
               <a:t>) </a:t>
             </a:r>
+            <a:endParaRPr lang="en-US" sz="2800" dirty="0" smtClean="0">
+              <a:solidFill>
+                <a:schemeClr val="accent4"/>
+              </a:solidFill>
+            </a:endParaRPr>
+          </a:p>
+          <a:p>
+            <a:endParaRPr lang="en-US" sz="2800" dirty="0">
+              <a:solidFill>
+                <a:schemeClr val="accent4"/>
+              </a:solidFill>
+            </a:endParaRPr>
+          </a:p>
+          <a:p>
+            <a:r>
+              <a:rPr lang="en-US" sz="2800" dirty="0" err="1" smtClean="0">
+                <a:solidFill>
+                  <a:schemeClr val="accent4"/>
+                </a:solidFill>
+              </a:rPr>
+              <a:t>Abdur</a:t>
+            </a:r>
+            <a:r>
+              <a:rPr lang="en-US" sz="2800" dirty="0" smtClean="0">
+                <a:solidFill>
+                  <a:schemeClr val="accent4"/>
+                </a:solidFill>
+              </a:rPr>
+              <a:t> Khan’s Command Line Blog/Tutorial:</a:t>
+            </a:r>
+          </a:p>
+          <a:p>
+            <a:r>
+              <a:rPr lang="en-US" sz="2800" dirty="0">
+                <a:solidFill>
+                  <a:schemeClr val="accent4"/>
+                </a:solidFill>
+              </a:rPr>
+              <a:t>(</a:t>
+            </a:r>
+            <a:r>
+              <a:rPr lang="en-US" sz="2800" dirty="0">
+                <a:solidFill>
+                  <a:schemeClr val="accent4"/>
+                </a:solidFill>
+                <a:hlinkClick r:id="rId6"/>
+              </a:rPr>
+              <a:t>http://</a:t>
+            </a:r>
+            <a:r>
+              <a:rPr lang="en-US" sz="2800" dirty="0" smtClean="0">
+                <a:solidFill>
+                  <a:schemeClr val="accent4"/>
+                </a:solidFill>
+                <a:hlinkClick r:id="rId6"/>
+              </a:rPr>
+              <a:t>bit.ly/2oBWtes</a:t>
+            </a:r>
+            <a:r>
+              <a:rPr lang="en-US" sz="2800" dirty="0" smtClean="0">
+                <a:solidFill>
+                  <a:schemeClr val="accent4"/>
+                </a:solidFill>
+              </a:rPr>
+              <a:t>) </a:t>
+            </a:r>
+            <a:endParaRPr lang="en-US" sz="2800" dirty="0">
+              <a:solidFill>
+                <a:schemeClr val="accent4"/>
+              </a:solidFill>
+            </a:endParaRPr>
           </a:p>
           <a:p>
             <a:pPr marL="0" marR="0" lvl="0" indent="0" algn="l" defTabSz="457200" rtl="0" eaLnBrk="1" fontAlgn="auto" latinLnBrk="0" hangingPunct="1">
@@ -9417,13 +9316,7 @@
               <a:rPr lang="en-US" sz="4400" dirty="0" smtClean="0">
                 <a:latin typeface="+mj-lt"/>
               </a:rPr>
-              <a:t>Controlling</a:t>
-            </a:r>
-            <a:r>
-              <a:rPr lang="en-US" sz="4400" dirty="0" smtClean="0">
-                <a:latin typeface="+mj-lt"/>
-              </a:rPr>
-              <a:t> Git?</a:t>
+              <a:t>Controlling Git?</a:t>
             </a:r>
             <a:endParaRPr lang="en-US" sz="4400" dirty="0">
               <a:latin typeface="+mj-lt"/>
@@ -9460,15 +9353,7 @@
                   <a:schemeClr val="accent4"/>
                 </a:solidFill>
               </a:rPr>
-              <a:t>GUI </a:t>
-            </a:r>
-            <a:r>
-              <a:rPr lang="en-US" sz="4400" dirty="0" smtClean="0">
-                <a:solidFill>
-                  <a:schemeClr val="accent4"/>
-                </a:solidFill>
-              </a:rPr>
-              <a:t>Client</a:t>
+              <a:t>GUI Client</a:t>
             </a:r>
           </a:p>
           <a:p>
@@ -9502,21 +9387,8 @@
                   <a:schemeClr val="accent5"/>
                 </a:solidFill>
               </a:rPr>
-              <a:t>Command </a:t>
-            </a:r>
-            <a:r>
-              <a:rPr lang="en-US" sz="4400" dirty="0" smtClean="0">
-                <a:solidFill>
-                  <a:schemeClr val="accent5"/>
-                </a:solidFill>
-              </a:rPr>
-              <a:t>Line</a:t>
-            </a:r>
-            <a:endParaRPr lang="en-US" sz="4400" dirty="0" smtClean="0">
-              <a:solidFill>
-                <a:schemeClr val="accent5"/>
-              </a:solidFill>
-            </a:endParaRPr>
+              <a:t>Command Line</a:t>
+            </a:r>
           </a:p>
         </p:txBody>
       </p:sp>
@@ -10278,13 +10150,7 @@
               <a:rPr lang="en-US" sz="4000" b="1" dirty="0" smtClean="0">
                 <a:latin typeface="+mj-lt"/>
               </a:rPr>
-              <a:t>Sample Workflow </a:t>
-            </a:r>
-            <a:r>
-              <a:rPr lang="en-US" sz="4000" b="1" dirty="0" smtClean="0">
-                <a:latin typeface="+mj-lt"/>
-              </a:rPr>
-              <a:t>Models</a:t>
+              <a:t>Sample Workflow Models</a:t>
             </a:r>
             <a:endParaRPr lang="en-US" sz="4000" b="1" dirty="0">
               <a:latin typeface="+mj-lt"/>
@@ -10380,15 +10246,7 @@
                   <a:schemeClr val="accent4"/>
                 </a:solidFill>
               </a:rPr>
-              <a:t> Project </a:t>
-            </a:r>
-            <a:r>
-              <a:rPr lang="en-US" sz="3200" dirty="0" smtClean="0">
-                <a:solidFill>
-                  <a:schemeClr val="accent4"/>
-                </a:solidFill>
-              </a:rPr>
-              <a:t>Repo: </a:t>
+              <a:t> Project Repo: </a:t>
             </a:r>
             <a:r>
               <a:rPr lang="en-US" sz="3200" dirty="0" err="1" smtClean="0">

</xml_diff>